<commit_message>
added screenshots to pres
</commit_message>
<xml_diff>
--- a/_presentation/Team 11 Presentation.pptx
+++ b/_presentation/Team 11 Presentation.pptx
@@ -5,7 +5,7 @@
     <p:sldMasterId id="2147483648" r:id="rId1"/>
   </p:sldMasterIdLst>
   <p:notesMasterIdLst>
-    <p:notesMasterId r:id="rId12"/>
+    <p:notesMasterId r:id="rId13"/>
   </p:notesMasterIdLst>
   <p:sldIdLst>
     <p:sldId id="256" r:id="rId2"/>
@@ -15,9 +15,10 @@
     <p:sldId id="264" r:id="rId6"/>
     <p:sldId id="265" r:id="rId7"/>
     <p:sldId id="262" r:id="rId8"/>
-    <p:sldId id="258" r:id="rId9"/>
-    <p:sldId id="257" r:id="rId10"/>
-    <p:sldId id="267" r:id="rId11"/>
+    <p:sldId id="270" r:id="rId9"/>
+    <p:sldId id="258" r:id="rId10"/>
+    <p:sldId id="257" r:id="rId11"/>
+    <p:sldId id="267" r:id="rId12"/>
   </p:sldIdLst>
   <p:sldSz cx="12192000" cy="6858000"/>
   <p:notesSz cx="6858000" cy="9144000"/>
@@ -134,6 +135,260 @@
     </p:extLst>
   </p:cmAuthor>
 </p:cmAuthorLst>
+</file>
+
+<file path=ppt/ink/ink1.xml><?xml version="1.0" encoding="utf-8"?>
+<inkml:ink xmlns:inkml="http://www.w3.org/2003/InkML">
+  <inkml:definitions>
+    <inkml:context xml:id="ctx0">
+      <inkml:inkSource xml:id="inkSrc0">
+        <inkml:traceFormat>
+          <inkml:channel name="X" type="integer" min="-2.14748E9" max="2.14748E9" units="cm"/>
+          <inkml:channel name="Y" type="integer" min="-2.14748E9" max="2.14748E9" units="cm"/>
+          <inkml:channel name="F" type="integer" max="32767" units="dev"/>
+        </inkml:traceFormat>
+        <inkml:channelProperties>
+          <inkml:channelProperty channel="X" name="resolution" value="1000" units="1/cm"/>
+          <inkml:channelProperty channel="Y" name="resolution" value="1000" units="1/cm"/>
+          <inkml:channelProperty channel="F" name="resolution" value="0" units="1/dev"/>
+        </inkml:channelProperties>
+      </inkml:inkSource>
+      <inkml:timestamp xml:id="ts0" timeString="2016-12-10T10:10:47.287"/>
+    </inkml:context>
+    <inkml:brush xml:id="br0">
+      <inkml:brushProperty name="width" value="0.02857" units="cm"/>
+      <inkml:brushProperty name="height" value="0.02857" units="cm"/>
+    </inkml:brush>
+  </inkml:definitions>
+  <inkml:traceGroup>
+    <inkml:annotationXML>
+      <emma:emma xmlns:emma="http://www.w3.org/2003/04/emma" version="1.0">
+        <emma:interpretation id="{76F5D9E0-F8FB-4F65-A21E-B2ECA6D5D381}" emma:medium="tactile" emma:mode="ink">
+          <msink:context xmlns:msink="http://schemas.microsoft.com/ink/2010/main" type="writingRegion" rotatedBoundingBox="16809,7032 19167,5826 19605,6682 17247,7888"/>
+        </emma:interpretation>
+      </emma:emma>
+    </inkml:annotationXML>
+    <inkml:traceGroup>
+      <inkml:annotationXML>
+        <emma:emma xmlns:emma="http://www.w3.org/2003/04/emma" version="1.0">
+          <emma:interpretation id="{934A61D4-F19D-47C4-8FA2-F63A5769BB72}" emma:medium="tactile" emma:mode="ink">
+            <msink:context xmlns:msink="http://schemas.microsoft.com/ink/2010/main" type="paragraph" rotatedBoundingBox="16809,7032 19167,5826 19605,6682 17247,7888" alignmentLevel="1"/>
+          </emma:interpretation>
+        </emma:emma>
+      </inkml:annotationXML>
+      <inkml:traceGroup>
+        <inkml:annotationXML>
+          <emma:emma xmlns:emma="http://www.w3.org/2003/04/emma" version="1.0">
+            <emma:interpretation id="{C478F058-70A4-4117-8CAF-E675A4F250F3}" emma:medium="tactile" emma:mode="ink">
+              <msink:context xmlns:msink="http://schemas.microsoft.com/ink/2010/main" type="line" rotatedBoundingBox="16809,7032 19167,5826 19605,6682 17247,7888"/>
+            </emma:interpretation>
+          </emma:emma>
+        </inkml:annotationXML>
+        <inkml:traceGroup>
+          <inkml:annotationXML>
+            <emma:emma xmlns:emma="http://www.w3.org/2003/04/emma" version="1.0">
+              <emma:interpretation id="{DAE2CBC0-1A23-4021-A971-6F54A8C4A621}" emma:medium="tactile" emma:mode="ink">
+                <msink:context xmlns:msink="http://schemas.microsoft.com/ink/2010/main" type="inkWord" rotatedBoundingBox="16957,7322 16992,7304 17006,7331 16971,7348"/>
+              </emma:interpretation>
+              <emma:one-of disjunction-type="recognition" id="oneOf0">
+                <emma:interpretation id="interp0" emma:lang="en-GB" emma:confidence="0">
+                  <emma:literal>&lt;</emma:literal>
+                </emma:interpretation>
+                <emma:interpretation id="interp1" emma:lang="en-GB" emma:confidence="0">
+                  <emma:literal>&gt;</emma:literal>
+                </emma:interpretation>
+                <emma:interpretation id="interp2" emma:lang="en-GB" emma:confidence="0">
+                  <emma:literal>`</emma:literal>
+                </emma:interpretation>
+                <emma:interpretation id="interp3" emma:lang="en-GB" emma:confidence="0">
+                  <emma:literal>.</emma:literal>
+                </emma:interpretation>
+                <emma:interpretation id="interp4" emma:lang="en-GB" emma:confidence="0">
+                  <emma:literal>c</emma:literal>
+                </emma:interpretation>
+              </emma:one-of>
+            </emma:emma>
+          </inkml:annotationXML>
+          <inkml:trace contextRef="#ctx0" brushRef="#br0">12646 8128 1152,'-22'22'512,"44"-22"-1024,-22 0 640,0 0-384,22 0 0</inkml:trace>
+        </inkml:traceGroup>
+        <inkml:traceGroup>
+          <inkml:annotationXML>
+            <emma:emma xmlns:emma="http://www.w3.org/2003/04/emma" version="1.0">
+              <emma:interpretation id="{F0C2B2B6-6C42-4851-91CD-5347AB377FC6}" emma:medium="tactile" emma:mode="ink">
+                <msink:context xmlns:msink="http://schemas.microsoft.com/ink/2010/main" type="inkWord" rotatedBoundingBox="17010,6929 17199,6833 17637,7688 17448,7785"/>
+              </emma:interpretation>
+              <emma:one-of disjunction-type="recognition" id="oneOf1">
+                <emma:interpretation id="interp5" emma:lang="en-GB" emma:confidence="0">
+                  <emma:literal>..</emma:literal>
+                </emma:interpretation>
+                <emma:interpretation id="interp6" emma:lang="en-GB" emma:confidence="0">
+                  <emma:literal>t:</emma:literal>
+                </emma:interpretation>
+                <emma:interpretation id="interp7" emma:lang="en-GB" emma:confidence="0">
+                  <emma:literal>o:</emma:literal>
+                </emma:interpretation>
+                <emma:interpretation id="interp8" emma:lang="en-GB" emma:confidence="0">
+                  <emma:literal>r:</emma:literal>
+                </emma:interpretation>
+                <emma:interpretation id="interp9" emma:lang="en-GB" emma:confidence="0">
+                  <emma:literal>...</emma:literal>
+                </emma:interpretation>
+              </emma:one-of>
+            </emma:emma>
+          </inkml:annotationXML>
+          <inkml:trace contextRef="#ctx0" brushRef="#br0" timeOffset="-469">13264 8460 2048,'-22'44'1024,"22"-22"-1664,0-22 1536,0 0-1152,22 0 128,-22-22-640,22 0 0</inkml:trace>
+          <inkml:trace contextRef="#ctx0" brushRef="#br0" timeOffset="467">12712 7775 0,'0'44'0</inkml:trace>
+          <inkml:trace contextRef="#ctx0" brushRef="#br0" timeOffset="637">12712 7748 512,'0'0'256,"38"0"-640,-38-39 256</inkml:trace>
+          <inkml:trace contextRef="#ctx0" brushRef="#br0" timeOffset="1244">12800 7709 1152,'-66'22'512,"88"0"-1536,-22-22 640</inkml:trace>
+        </inkml:traceGroup>
+        <inkml:traceGroup>
+          <inkml:annotationXML>
+            <emma:emma xmlns:emma="http://www.w3.org/2003/04/emma" version="1.0">
+              <emma:interpretation id="{6F7BA3A6-B900-436C-88DA-7CC7693C1358}" emma:medium="tactile" emma:mode="ink">
+                <msink:context xmlns:msink="http://schemas.microsoft.com/ink/2010/main" type="inkWord" rotatedBoundingBox="18720,6115 19191,5874 19521,6519 19050,6760"/>
+              </emma:interpretation>
+              <emma:one-of disjunction-type="recognition" id="oneOf2">
+                <emma:interpretation id="interp10" emma:lang="en-GB" emma:confidence="0">
+                  <emma:literal>|</emma:literal>
+                </emma:interpretation>
+                <emma:interpretation id="interp11" emma:lang="en-GB" emma:confidence="0">
+                  <emma:literal>/</emma:literal>
+                </emma:interpretation>
+                <emma:interpretation id="interp12" emma:lang="en-GB" emma:confidence="0">
+                  <emma:literal>r</emma:literal>
+                </emma:interpretation>
+                <emma:interpretation id="interp13" emma:lang="en-GB" emma:confidence="0">
+                  <emma:literal>.</emma:literal>
+                </emma:interpretation>
+                <emma:interpretation id="interp14" emma:lang="en-GB" emma:confidence="0">
+                  <emma:literal>\</emma:literal>
+                </emma:interpretation>
+              </emma:one-of>
+            </emma:emma>
+          </inkml:annotationXML>
+          <inkml:trace contextRef="#ctx0" brushRef="#br0" timeOffset="-982">14744 7511 1536,'0'0'768,"-22"0"-128,22 0 896,0 0-1408,0 0 128,-22 0-128,22 21 128,0-21-384,-22-21 128,22 21 128,0 0 0,0 0-128,0 0 128,0 0-128,0-23 0,0 23 0,0-22 0,0 22 0,0-22 0,0 0 0,0 0 128,22 0-128,-22 0 0,0 0 0,0-22 0,22 21 0,-22-21 128,22 0-128,-22 22 128,22-22-128,-22 0 128,0 22-128,22-1 128,-22-21-128,0 22 128,22-22-128,-22 22 0,0 0 0,0 0 128,0 0-256,0 0 128,22 0-512,-22-1 0,0 2-256,22-24 0</inkml:trace>
+          <inkml:trace contextRef="#ctx0" brushRef="#br0" timeOffset="-1381">14811 7510 128,'0'0'0</inkml:trace>
+        </inkml:traceGroup>
+      </inkml:traceGroup>
+    </inkml:traceGroup>
+  </inkml:traceGroup>
+</inkml:ink>
+</file>
+
+<file path=ppt/ink/ink2.xml><?xml version="1.0" encoding="utf-8"?>
+<inkml:ink xmlns:inkml="http://www.w3.org/2003/InkML">
+  <inkml:definitions>
+    <inkml:context xml:id="ctx0">
+      <inkml:inkSource xml:id="inkSrc0">
+        <inkml:traceFormat>
+          <inkml:channel name="X" type="integer" min="-2.14748E9" max="2.14748E9" units="cm"/>
+          <inkml:channel name="Y" type="integer" min="-2.14748E9" max="2.14748E9" units="cm"/>
+          <inkml:channel name="F" type="integer" max="32767" units="dev"/>
+        </inkml:traceFormat>
+        <inkml:channelProperties>
+          <inkml:channelProperty channel="X" name="resolution" value="1000" units="1/cm"/>
+          <inkml:channelProperty channel="Y" name="resolution" value="1000" units="1/cm"/>
+          <inkml:channelProperty channel="F" name="resolution" value="0" units="1/dev"/>
+        </inkml:channelProperties>
+      </inkml:inkSource>
+      <inkml:timestamp xml:id="ts0" timeString="2016-12-10T10:10:48.339"/>
+    </inkml:context>
+    <inkml:brush xml:id="br0">
+      <inkml:brushProperty name="width" value="0.02857" units="cm"/>
+      <inkml:brushProperty name="height" value="0.02857" units="cm"/>
+    </inkml:brush>
+  </inkml:definitions>
+  <inkml:traceGroup>
+    <inkml:annotationXML>
+      <emma:emma xmlns:emma="http://www.w3.org/2003/04/emma" version="1.0">
+        <emma:interpretation id="{D4EEE54F-8279-4393-961C-DBDB9017EE50}" emma:medium="tactile" emma:mode="ink">
+          <msink:context xmlns:msink="http://schemas.microsoft.com/ink/2010/main" type="inkDrawing"/>
+        </emma:interpretation>
+      </emma:emma>
+    </inkml:annotationXML>
+    <inkml:trace contextRef="#ctx0" brushRef="#br0">13204 7489 0,'0'0'0</inkml:trace>
+  </inkml:traceGroup>
+</inkml:ink>
+</file>
+
+<file path=ppt/ink/ink3.xml><?xml version="1.0" encoding="utf-8"?>
+<inkml:ink xmlns:inkml="http://www.w3.org/2003/InkML">
+  <inkml:definitions>
+    <inkml:context xml:id="ctx0">
+      <inkml:inkSource xml:id="inkSrc0">
+        <inkml:traceFormat>
+          <inkml:channel name="X" type="integer" min="-2.14748E9" max="2.14748E9" units="cm"/>
+          <inkml:channel name="Y" type="integer" min="-2.14748E9" max="2.14748E9" units="cm"/>
+          <inkml:channel name="F" type="integer" max="32767" units="dev"/>
+        </inkml:traceFormat>
+        <inkml:channelProperties>
+          <inkml:channelProperty channel="X" name="resolution" value="1000" units="1/cm"/>
+          <inkml:channelProperty channel="Y" name="resolution" value="1000" units="1/cm"/>
+          <inkml:channelProperty channel="F" name="resolution" value="0" units="1/dev"/>
+        </inkml:channelProperties>
+      </inkml:inkSource>
+      <inkml:timestamp xml:id="ts0" timeString="2016-12-10T10:11:44.177"/>
+    </inkml:context>
+    <inkml:brush xml:id="br0">
+      <inkml:brushProperty name="width" value="0.02857" units="cm"/>
+      <inkml:brushProperty name="height" value="0.02857" units="cm"/>
+    </inkml:brush>
+  </inkml:definitions>
+  <inkml:traceGroup>
+    <inkml:annotationXML>
+      <emma:emma xmlns:emma="http://www.w3.org/2003/04/emma" version="1.0">
+        <emma:interpretation id="{BB2D804A-95AE-4A51-8047-F17DF7A91CC3}" emma:medium="tactile" emma:mode="ink">
+          <msink:context xmlns:msink="http://schemas.microsoft.com/ink/2010/main" type="writingRegion" rotatedBoundingBox="18530,1719 18574,1719 18574,1744 18530,1744"/>
+        </emma:interpretation>
+      </emma:emma>
+    </inkml:annotationXML>
+    <inkml:traceGroup>
+      <inkml:annotationXML>
+        <emma:emma xmlns:emma="http://www.w3.org/2003/04/emma" version="1.0">
+          <emma:interpretation id="{24FAD8B6-A42D-4D09-ABD3-D1941B59471A}" emma:medium="tactile" emma:mode="ink">
+            <msink:context xmlns:msink="http://schemas.microsoft.com/ink/2010/main" type="paragraph" rotatedBoundingBox="18530,1719 18574,1719 18574,1744 18530,1744" alignmentLevel="1"/>
+          </emma:interpretation>
+        </emma:emma>
+      </inkml:annotationXML>
+      <inkml:traceGroup>
+        <inkml:annotationXML>
+          <emma:emma xmlns:emma="http://www.w3.org/2003/04/emma" version="1.0">
+            <emma:interpretation id="{E5B2D3E3-7EF0-4B51-B9AA-A6CEB196AC94}" emma:medium="tactile" emma:mode="ink">
+              <msink:context xmlns:msink="http://schemas.microsoft.com/ink/2010/main" type="line" rotatedBoundingBox="18530,1719 18574,1719 18574,1744 18530,1744"/>
+            </emma:interpretation>
+          </emma:emma>
+        </inkml:annotationXML>
+        <inkml:traceGroup>
+          <inkml:annotationXML>
+            <emma:emma xmlns:emma="http://www.w3.org/2003/04/emma" version="1.0">
+              <emma:interpretation id="{63238EA3-952D-4575-95D7-9674F8140FA6}" emma:medium="tactile" emma:mode="ink">
+                <msink:context xmlns:msink="http://schemas.microsoft.com/ink/2010/main" type="inkWord" rotatedBoundingBox="18530,1719 18574,1719 18574,1744 18530,1744"/>
+              </emma:interpretation>
+              <emma:one-of disjunction-type="recognition" id="oneOf0">
+                <emma:interpretation id="interp0" emma:lang="en-GB" emma:confidence="0">
+                  <emma:literal>.</emma:literal>
+                </emma:interpretation>
+                <emma:interpretation id="interp1" emma:lang="en-GB" emma:confidence="0">
+                  <emma:literal>`</emma:literal>
+                </emma:interpretation>
+                <emma:interpretation id="interp2" emma:lang="en-GB" emma:confidence="0">
+                  <emma:literal>~</emma:literal>
+                </emma:interpretation>
+                <emma:interpretation id="interp3" emma:lang="en-GB" emma:confidence="0">
+                  <emma:literal>-</emma:literal>
+                </emma:interpretation>
+                <emma:interpretation id="interp4" emma:lang="en-GB" emma:confidence="0">
+                  <emma:literal>'</emma:literal>
+                </emma:interpretation>
+              </emma:one-of>
+            </emma:emma>
+          </inkml:annotationXML>
+          <inkml:trace contextRef="#ctx0" brushRef="#br0">14357 3601 1152,'-44'-22'512,"44"22"-1408,0 0 512</inkml:trace>
+        </inkml:traceGroup>
+      </inkml:traceGroup>
+    </inkml:traceGroup>
+  </inkml:traceGroup>
+</inkml:ink>
 </file>
 
 <file path=ppt/notesMasters/notesMaster1.xml><?xml version="1.0" encoding="utf-8"?>
@@ -1136,120 +1391,10 @@
           <a:bodyPr/>
           <a:lstStyle/>
           <a:p>
-            <a:pPr marL="0" marR="0" lvl="0" indent="0" algn="l" defTabSz="914400" rtl="0" eaLnBrk="1" fontAlgn="auto" latinLnBrk="0" hangingPunct="1">
-              <a:lnSpc>
-                <a:spcPct val="100000"/>
-              </a:lnSpc>
-              <a:spcBef>
-                <a:spcPts val="0"/>
-              </a:spcBef>
-              <a:spcAft>
-                <a:spcPts val="0"/>
-              </a:spcAft>
-              <a:buClrTx/>
-              <a:buSzTx/>
-              <a:buFontTx/>
-              <a:buNone/>
-              <a:tabLst/>
-              <a:defRPr/>
-            </a:pPr>
             <a:r>
               <a:rPr lang="en-GB" dirty="0"/>
-              <a:t>Instead of having a generic health </a:t>
-            </a:r>
-          </a:p>
-          <a:p>
-            <a:pPr marL="0" marR="0" lvl="0" indent="0" algn="l" defTabSz="914400" rtl="0" eaLnBrk="1" fontAlgn="auto" latinLnBrk="0" hangingPunct="1">
-              <a:lnSpc>
-                <a:spcPct val="100000"/>
-              </a:lnSpc>
-              <a:spcBef>
-                <a:spcPts val="0"/>
-              </a:spcBef>
-              <a:spcAft>
-                <a:spcPts val="0"/>
-              </a:spcAft>
-              <a:buClrTx/>
-              <a:buSzTx/>
-              <a:buFontTx/>
-              <a:buNone/>
-              <a:tabLst/>
-              <a:defRPr/>
-            </a:pPr>
-            <a:r>
-              <a:rPr lang="en-GB" dirty="0"/>
-              <a:t>to store many more questions that can be queried by a web server for questions to make the selection random each time.</a:t>
-            </a:r>
-          </a:p>
-          <a:p>
-            <a:pPr marL="0" marR="0" lvl="0" indent="0" algn="l" defTabSz="914400" rtl="0" eaLnBrk="1" fontAlgn="auto" latinLnBrk="0" hangingPunct="1">
-              <a:lnSpc>
-                <a:spcPct val="100000"/>
-              </a:lnSpc>
-              <a:spcBef>
-                <a:spcPts val="0"/>
-              </a:spcBef>
-              <a:spcAft>
-                <a:spcPts val="0"/>
-              </a:spcAft>
-              <a:buClrTx/>
-              <a:buSzTx/>
-              <a:buFontTx/>
-              <a:buNone/>
-              <a:tabLst/>
-              <a:defRPr/>
-            </a:pPr>
-            <a:r>
-              <a:rPr lang="en-GB" dirty="0"/>
-              <a:t>As a incentive to share the application with friends, the sharer will be rewarded</a:t>
-            </a:r>
-            <a:r>
-              <a:rPr lang="en-GB" baseline="0" dirty="0"/>
-              <a:t> with it. A</a:t>
-            </a:r>
-            <a:r>
-              <a:rPr lang="en-GB" dirty="0"/>
-              <a:t>s previously created snapchat filters have proven successful. </a:t>
-            </a:r>
-            <a:r>
-              <a:rPr lang="en-GB" baseline="0" dirty="0"/>
-              <a:t> A</a:t>
-            </a:r>
-            <a:r>
-              <a:rPr lang="en-GB" dirty="0"/>
-              <a:t>llowing follower to send cash through a linked debit card.</a:t>
-            </a:r>
-          </a:p>
-          <a:p>
-            <a:pPr marL="0" marR="0" lvl="0" indent="0" algn="l" defTabSz="914400" rtl="0" eaLnBrk="1" fontAlgn="auto" latinLnBrk="0" hangingPunct="1">
-              <a:lnSpc>
-                <a:spcPct val="100000"/>
-              </a:lnSpc>
-              <a:spcBef>
-                <a:spcPts val="0"/>
-              </a:spcBef>
-              <a:spcAft>
-                <a:spcPts val="0"/>
-              </a:spcAft>
-              <a:buClrTx/>
-              <a:buSzTx/>
-              <a:buFontTx/>
-              <a:buNone/>
-              <a:tabLst/>
-              <a:defRPr/>
-            </a:pPr>
-            <a:r>
-              <a:rPr lang="en-GB" dirty="0"/>
-              <a:t>Currently</a:t>
-            </a:r>
-            <a:r>
-              <a:rPr lang="en-GB" baseline="0" dirty="0"/>
-              <a:t> allows you to share your score and the site link to your feed but more integration can allow the user to allow share their profile with the site, allowing us to tailor questions based on their profile.</a:t>
-            </a:r>
-            <a:endParaRPr lang="en-GB" dirty="0"/>
-          </a:p>
-          <a:p>
-            <a:endParaRPr lang="en-GB" dirty="0"/>
+              <a:t>Landing page asks them for a question</a:t>
+            </a:r>
           </a:p>
         </p:txBody>
       </p:sp>
@@ -1279,7 +1424,7 @@
     </p:spTree>
     <p:extLst>
       <p:ext uri="{BB962C8B-B14F-4D97-AF65-F5344CB8AC3E}">
-        <p14:creationId xmlns:p14="http://schemas.microsoft.com/office/powerpoint/2010/main" val="188750156"/>
+        <p14:creationId xmlns:p14="http://schemas.microsoft.com/office/powerpoint/2010/main" val="36719835"/>
       </p:ext>
     </p:extLst>
   </p:cSld>
@@ -1333,6 +1478,203 @@
           <a:bodyPr/>
           <a:lstStyle/>
           <a:p>
+            <a:pPr marL="0" marR="0" lvl="0" indent="0" algn="l" defTabSz="914400" rtl="0" eaLnBrk="1" fontAlgn="auto" latinLnBrk="0" hangingPunct="1">
+              <a:lnSpc>
+                <a:spcPct val="100000"/>
+              </a:lnSpc>
+              <a:spcBef>
+                <a:spcPts val="0"/>
+              </a:spcBef>
+              <a:spcAft>
+                <a:spcPts val="0"/>
+              </a:spcAft>
+              <a:buClrTx/>
+              <a:buSzTx/>
+              <a:buFontTx/>
+              <a:buNone/>
+              <a:tabLst/>
+              <a:defRPr/>
+            </a:pPr>
+            <a:r>
+              <a:rPr lang="en-GB" dirty="0"/>
+              <a:t>Instead of having a generic health </a:t>
+            </a:r>
+          </a:p>
+          <a:p>
+            <a:pPr marL="0" marR="0" lvl="0" indent="0" algn="l" defTabSz="914400" rtl="0" eaLnBrk="1" fontAlgn="auto" latinLnBrk="0" hangingPunct="1">
+              <a:lnSpc>
+                <a:spcPct val="100000"/>
+              </a:lnSpc>
+              <a:spcBef>
+                <a:spcPts val="0"/>
+              </a:spcBef>
+              <a:spcAft>
+                <a:spcPts val="0"/>
+              </a:spcAft>
+              <a:buClrTx/>
+              <a:buSzTx/>
+              <a:buFontTx/>
+              <a:buNone/>
+              <a:tabLst/>
+              <a:defRPr/>
+            </a:pPr>
+            <a:r>
+              <a:rPr lang="en-GB" dirty="0"/>
+              <a:t>to store many more questions that can be queried by a web server for questions to make the selection random each time.</a:t>
+            </a:r>
+          </a:p>
+          <a:p>
+            <a:pPr marL="0" marR="0" lvl="0" indent="0" algn="l" defTabSz="914400" rtl="0" eaLnBrk="1" fontAlgn="auto" latinLnBrk="0" hangingPunct="1">
+              <a:lnSpc>
+                <a:spcPct val="100000"/>
+              </a:lnSpc>
+              <a:spcBef>
+                <a:spcPts val="0"/>
+              </a:spcBef>
+              <a:spcAft>
+                <a:spcPts val="0"/>
+              </a:spcAft>
+              <a:buClrTx/>
+              <a:buSzTx/>
+              <a:buFontTx/>
+              <a:buNone/>
+              <a:tabLst/>
+              <a:defRPr/>
+            </a:pPr>
+            <a:r>
+              <a:rPr lang="en-GB" dirty="0"/>
+              <a:t>As a incentive to share the application with friends, the sharer will be rewarded</a:t>
+            </a:r>
+            <a:r>
+              <a:rPr lang="en-GB" baseline="0" dirty="0"/>
+              <a:t> with it. A</a:t>
+            </a:r>
+            <a:r>
+              <a:rPr lang="en-GB" dirty="0"/>
+              <a:t>s previously created snapchat filters have proven successful. </a:t>
+            </a:r>
+            <a:r>
+              <a:rPr lang="en-GB" baseline="0" dirty="0"/>
+              <a:t> A</a:t>
+            </a:r>
+            <a:r>
+              <a:rPr lang="en-GB" dirty="0"/>
+              <a:t>llowing follower to send cash through a linked debit card.</a:t>
+            </a:r>
+          </a:p>
+          <a:p>
+            <a:pPr marL="0" marR="0" lvl="0" indent="0" algn="l" defTabSz="914400" rtl="0" eaLnBrk="1" fontAlgn="auto" latinLnBrk="0" hangingPunct="1">
+              <a:lnSpc>
+                <a:spcPct val="100000"/>
+              </a:lnSpc>
+              <a:spcBef>
+                <a:spcPts val="0"/>
+              </a:spcBef>
+              <a:spcAft>
+                <a:spcPts val="0"/>
+              </a:spcAft>
+              <a:buClrTx/>
+              <a:buSzTx/>
+              <a:buFontTx/>
+              <a:buNone/>
+              <a:tabLst/>
+              <a:defRPr/>
+            </a:pPr>
+            <a:r>
+              <a:rPr lang="en-GB" dirty="0"/>
+              <a:t>Currently</a:t>
+            </a:r>
+            <a:r>
+              <a:rPr lang="en-GB" baseline="0" dirty="0"/>
+              <a:t> allows you to share your score and the site link to your feed but more integration can allow the user to allow share their profile with the site, allowing us to tailor questions based on their profile.</a:t>
+            </a:r>
+            <a:endParaRPr lang="en-GB" dirty="0"/>
+          </a:p>
+          <a:p>
+            <a:endParaRPr lang="en-GB" dirty="0"/>
+          </a:p>
+        </p:txBody>
+      </p:sp>
+      <p:sp>
+        <p:nvSpPr>
+          <p:cNvPr id="4" name="Slide Number Placeholder 3"/>
+          <p:cNvSpPr>
+            <a:spLocks noGrp="1"/>
+          </p:cNvSpPr>
+          <p:nvPr>
+            <p:ph type="sldNum" sz="quarter" idx="10"/>
+          </p:nvPr>
+        </p:nvSpPr>
+        <p:spPr/>
+        <p:txBody>
+          <a:bodyPr/>
+          <a:lstStyle/>
+          <a:p>
+            <a:fld id="{CDE8920A-880C-4DAA-A893-D2B86E971586}" type="slidenum">
+              <a:rPr lang="en-GB" smtClean="0"/>
+              <a:t>9</a:t>
+            </a:fld>
+            <a:endParaRPr lang="en-GB"/>
+          </a:p>
+        </p:txBody>
+      </p:sp>
+    </p:spTree>
+    <p:extLst>
+      <p:ext uri="{BB962C8B-B14F-4D97-AF65-F5344CB8AC3E}">
+        <p14:creationId xmlns:p14="http://schemas.microsoft.com/office/powerpoint/2010/main" val="188750156"/>
+      </p:ext>
+    </p:extLst>
+  </p:cSld>
+  <p:clrMapOvr>
+    <a:masterClrMapping/>
+  </p:clrMapOvr>
+</p:notes>
+</file>
+
+<file path=ppt/notesSlides/notesSlide9.xml><?xml version="1.0" encoding="utf-8"?>
+<p:notes xmlns:a="http://schemas.openxmlformats.org/drawingml/2006/main" xmlns:r="http://schemas.openxmlformats.org/officeDocument/2006/relationships" xmlns:p="http://schemas.openxmlformats.org/presentationml/2006/main">
+  <p:cSld>
+    <p:spTree>
+      <p:nvGrpSpPr>
+        <p:cNvPr id="1" name=""/>
+        <p:cNvGrpSpPr/>
+        <p:nvPr/>
+      </p:nvGrpSpPr>
+      <p:grpSpPr>
+        <a:xfrm>
+          <a:off x="0" y="0"/>
+          <a:ext cx="0" cy="0"/>
+          <a:chOff x="0" y="0"/>
+          <a:chExt cx="0" cy="0"/>
+        </a:xfrm>
+      </p:grpSpPr>
+      <p:sp>
+        <p:nvSpPr>
+          <p:cNvPr id="2" name="Slide Image Placeholder 1"/>
+          <p:cNvSpPr>
+            <a:spLocks noGrp="1" noRot="1" noChangeAspect="1"/>
+          </p:cNvSpPr>
+          <p:nvPr>
+            <p:ph type="sldImg"/>
+          </p:nvPr>
+        </p:nvSpPr>
+        <p:spPr/>
+      </p:sp>
+      <p:sp>
+        <p:nvSpPr>
+          <p:cNvPr id="3" name="Notes Placeholder 2"/>
+          <p:cNvSpPr>
+            <a:spLocks noGrp="1"/>
+          </p:cNvSpPr>
+          <p:nvPr>
+            <p:ph type="body" idx="1"/>
+          </p:nvPr>
+        </p:nvSpPr>
+        <p:spPr/>
+        <p:txBody>
+          <a:bodyPr/>
+          <a:lstStyle/>
+          <a:p>
             <a:pPr marL="228600" indent="-228600">
               <a:buAutoNum type="arabicPeriod"/>
             </a:pPr>
@@ -1454,7 +1796,7 @@
           <a:p>
             <a:fld id="{CDE8920A-880C-4DAA-A893-D2B86E971586}" type="slidenum">
               <a:rPr lang="en-GB" smtClean="0"/>
-              <a:t>9</a:t>
+              <a:t>10</a:t>
             </a:fld>
             <a:endParaRPr lang="en-GB"/>
           </a:p>
@@ -4523,6 +4865,353 @@
           <a:chExt cx="0" cy="0"/>
         </a:xfrm>
       </p:grpSpPr>
+      <p:sp>
+        <p:nvSpPr>
+          <p:cNvPr id="2" name="Title 1"/>
+          <p:cNvSpPr>
+            <a:spLocks noGrp="1"/>
+          </p:cNvSpPr>
+          <p:nvPr>
+            <p:ph type="title"/>
+          </p:nvPr>
+        </p:nvSpPr>
+        <p:spPr/>
+        <p:txBody>
+          <a:bodyPr>
+            <a:normAutofit/>
+          </a:bodyPr>
+          <a:lstStyle/>
+          <a:p>
+            <a:r>
+              <a:rPr lang="en-GB" sz="4800" b="1" dirty="0"/>
+              <a:t>References:</a:t>
+            </a:r>
+          </a:p>
+        </p:txBody>
+      </p:sp>
+      <p:sp>
+        <p:nvSpPr>
+          <p:cNvPr id="3" name="Content Placeholder 2"/>
+          <p:cNvSpPr>
+            <a:spLocks noGrp="1"/>
+          </p:cNvSpPr>
+          <p:nvPr>
+            <p:ph idx="1"/>
+          </p:nvPr>
+        </p:nvSpPr>
+        <p:spPr>
+          <a:xfrm>
+            <a:off x="465221" y="1825625"/>
+            <a:ext cx="10888579" cy="4351338"/>
+          </a:xfrm>
+        </p:spPr>
+        <p:txBody>
+          <a:bodyPr>
+            <a:normAutofit lnSpcReduction="10000"/>
+          </a:bodyPr>
+          <a:lstStyle/>
+          <a:p>
+            <a:pPr lvl="1">
+              <a:buFont typeface="+mj-lt"/>
+              <a:buAutoNum type="arabicPeriod"/>
+            </a:pPr>
+            <a:r>
+              <a:rPr lang="en-GB" sz="1200" dirty="0"/>
+              <a:t>“What is the most common form of dementia?”</a:t>
+            </a:r>
+            <a:br>
+              <a:rPr lang="en-GB" sz="1200" dirty="0"/>
+            </a:br>
+            <a:r>
+              <a:rPr lang="en-GB" sz="1200" i="1" dirty="0">
+                <a:solidFill>
+                  <a:srgbClr val="FF9900"/>
+                </a:solidFill>
+              </a:rPr>
+              <a:t>Judd, N. and Society, A. (2007) What is Alzheimer’s disease? - Alzheimer’s society. Available at: https://www.alzheimers.org.uk/site/scripts/documents_info.php?documentID=100 (Accessed: 10 December 2016).</a:t>
+            </a:r>
+          </a:p>
+          <a:p>
+            <a:pPr lvl="1">
+              <a:buFont typeface="+mj-lt"/>
+              <a:buAutoNum type="arabicPeriod"/>
+            </a:pPr>
+            <a:r>
+              <a:rPr lang="en-GB" sz="1200" dirty="0"/>
+              <a:t>“Who has a higher risk of developing Alzheimer’s disease?”</a:t>
+            </a:r>
+            <a:br>
+              <a:rPr lang="en-GB" sz="1200" dirty="0"/>
+            </a:br>
+            <a:r>
+              <a:rPr lang="en-GB" sz="1200" i="1" dirty="0">
+                <a:solidFill>
+                  <a:srgbClr val="FF9900"/>
+                </a:solidFill>
+              </a:rPr>
+              <a:t>Sauer, A. (2015) Why is Alzheimer’s more likely in women? Available at: http://www.alzheimers.net/8-12-15-why-is-alzheimers-more-likely-in-women/ (Accessed: 10 December 2016).</a:t>
+            </a:r>
+          </a:p>
+          <a:p>
+            <a:pPr lvl="1">
+              <a:buFont typeface="+mj-lt"/>
+              <a:buAutoNum type="arabicPeriod"/>
+            </a:pPr>
+            <a:r>
+              <a:rPr lang="en-GB" sz="1200" dirty="0"/>
+              <a:t>“What are the two proteins responsible for dementia?”</a:t>
+            </a:r>
+            <a:br>
+              <a:rPr lang="en-GB" sz="1200" dirty="0"/>
+            </a:br>
+            <a:r>
+              <a:rPr lang="en-GB" sz="1200" i="1" dirty="0">
+                <a:solidFill>
+                  <a:srgbClr val="FF9900"/>
+                </a:solidFill>
+              </a:rPr>
+              <a:t>Bloom, G.S. (2014) ‘Amyloid-</a:t>
+            </a:r>
+            <a:r>
+              <a:rPr lang="el-GR" sz="1200" i="1" dirty="0">
+                <a:solidFill>
+                  <a:srgbClr val="FF9900"/>
+                </a:solidFill>
+              </a:rPr>
+              <a:t>β </a:t>
+            </a:r>
+            <a:r>
+              <a:rPr lang="en-GB" sz="1200" i="1" dirty="0">
+                <a:solidFill>
+                  <a:srgbClr val="FF9900"/>
+                </a:solidFill>
+              </a:rPr>
+              <a:t>and Tau’, JAMA Neurology, 71(4), p. 505. </a:t>
+            </a:r>
+            <a:r>
+              <a:rPr lang="en-GB" sz="1200" i="1" dirty="0" err="1">
+                <a:solidFill>
+                  <a:srgbClr val="FF9900"/>
+                </a:solidFill>
+              </a:rPr>
+              <a:t>doi</a:t>
+            </a:r>
+            <a:r>
+              <a:rPr lang="en-GB" sz="1200" i="1" dirty="0">
+                <a:solidFill>
+                  <a:srgbClr val="FF9900"/>
+                </a:solidFill>
+              </a:rPr>
+              <a:t>: 10.1001/jamaneurol.2013.5847.</a:t>
+            </a:r>
+          </a:p>
+          <a:p>
+            <a:pPr lvl="1">
+              <a:buFont typeface="+mj-lt"/>
+              <a:buAutoNum type="arabicPeriod"/>
+            </a:pPr>
+            <a:r>
+              <a:rPr lang="en-GB" sz="1200" dirty="0"/>
+              <a:t>“Is there a cure for Alzheimer’s disease?”</a:t>
+            </a:r>
+            <a:br>
+              <a:rPr lang="en-GB" sz="1200" dirty="0"/>
+            </a:br>
+            <a:r>
+              <a:rPr lang="en-GB" sz="1200" i="1" dirty="0">
+                <a:solidFill>
+                  <a:srgbClr val="FF9900"/>
+                </a:solidFill>
+              </a:rPr>
+              <a:t>Association®, A. (2016) Latest treatment options. Available at: http://www.alz.org/alzheimers_disease_treatments.asp (Accessed: 10 December 2016).</a:t>
+            </a:r>
+          </a:p>
+          <a:p>
+            <a:pPr lvl="1">
+              <a:buFont typeface="+mj-lt"/>
+              <a:buAutoNum type="arabicPeriod"/>
+            </a:pPr>
+            <a:r>
+              <a:rPr lang="en-GB" sz="1200" dirty="0"/>
+              <a:t>“How much does dementia effect the global economy?”</a:t>
+            </a:r>
+            <a:br>
+              <a:rPr lang="en-GB" sz="1200" i="1" dirty="0"/>
+            </a:br>
+            <a:r>
+              <a:rPr lang="en-GB" sz="1200" dirty="0">
+                <a:solidFill>
+                  <a:srgbClr val="FF9900"/>
+                </a:solidFill>
+              </a:rPr>
+              <a:t>10 things you need to know about the impact of dementia on people, carers and the economy | Alzheimer’s research UK (2017) Available at: http://www.alzheimersresearchuk.org/about-dementia/facts-stats/10-things-you-need-to-know-about-the-impact-of-dementia/ (Accessed: 10 December 2016).</a:t>
+            </a:r>
+          </a:p>
+          <a:p>
+            <a:pPr lvl="1">
+              <a:buFont typeface="+mj-lt"/>
+              <a:buAutoNum type="arabicPeriod"/>
+            </a:pPr>
+            <a:r>
+              <a:rPr lang="en-GB" sz="1200" dirty="0"/>
+              <a:t>“Is Alzheimer’s disease fatal?”</a:t>
+            </a:r>
+            <a:br>
+              <a:rPr lang="en-GB" sz="1200" dirty="0"/>
+            </a:br>
+            <a:r>
+              <a:rPr lang="en-GB" sz="1200" i="1" dirty="0">
+                <a:solidFill>
+                  <a:srgbClr val="FF9900"/>
+                </a:solidFill>
+              </a:rPr>
+              <a:t>Association®, A. (2016) Memory loss myths &amp; facts. Available at: http://www.alz.org/alzheimers_disease_myths_about_alzheimers.asp (Accessed: 10 December 2016).</a:t>
+            </a:r>
+          </a:p>
+          <a:p>
+            <a:pPr lvl="1">
+              <a:buFont typeface="+mj-lt"/>
+              <a:buAutoNum type="arabicPeriod"/>
+            </a:pPr>
+            <a:r>
+              <a:rPr lang="en-GB" sz="1200" dirty="0"/>
+              <a:t>Does Alzheimer's only effect people over 65? </a:t>
+            </a:r>
+            <a:br>
+              <a:rPr lang="en-GB" sz="1200" dirty="0"/>
+            </a:br>
+            <a:r>
+              <a:rPr lang="en-GB" sz="1200" i="1" dirty="0">
+                <a:solidFill>
+                  <a:srgbClr val="FF9900"/>
+                </a:solidFill>
+              </a:rPr>
+              <a:t>Association®, A. (2016) Memory loss myths &amp; facts. Available at: http://www.alz.org/alzheimers_disease_myths_about_alzheimers.asp (Accessed: 10 December 2016).</a:t>
+            </a:r>
+          </a:p>
+          <a:p>
+            <a:pPr lvl="1">
+              <a:buFont typeface="+mj-lt"/>
+              <a:buAutoNum type="arabicPeriod"/>
+            </a:pPr>
+            <a:r>
+              <a:rPr lang="en-GB" sz="1200" dirty="0"/>
+              <a:t>“Alzheimer’s and </a:t>
+            </a:r>
+            <a:r>
+              <a:rPr lang="en-GB" sz="1200" dirty="0" err="1"/>
+              <a:t>Dimentia</a:t>
+            </a:r>
+            <a:r>
+              <a:rPr lang="en-GB" sz="1200" dirty="0"/>
+              <a:t> are the leading causes of death in the UK?”</a:t>
+            </a:r>
+            <a:br>
+              <a:rPr lang="en-GB" sz="1200" dirty="0"/>
+            </a:br>
+            <a:r>
+              <a:rPr lang="en-GB" sz="1200" i="1" dirty="0">
+                <a:solidFill>
+                  <a:srgbClr val="FF9900"/>
+                </a:solidFill>
+              </a:rPr>
+              <a:t>Siddique, H. (2016) Dementia and Alzheimer’s leading cause of death in England and wales. Available at: https://www.theguardian.com/society/2016/nov/14/dementia-and-alzheimers-leading-cause-of-death-england-and-wales (Accessed: 10 December 2016).</a:t>
+            </a:r>
+          </a:p>
+          <a:p>
+            <a:pPr lvl="1">
+              <a:buFont typeface="+mj-lt"/>
+              <a:buAutoNum type="arabicPeriod"/>
+            </a:pPr>
+            <a:r>
+              <a:rPr lang="en-GB" sz="1200" dirty="0"/>
+              <a:t>“Are the most prominent symptoms of Alzheimer's disease include memory loss, gradual loss of speech, and/or difficulties with any physical movements?”</a:t>
+            </a:r>
+            <a:br>
+              <a:rPr lang="en-GB" sz="1200" dirty="0"/>
+            </a:br>
+            <a:r>
+              <a:rPr lang="en-GB" sz="1200" i="1" dirty="0">
+                <a:solidFill>
+                  <a:srgbClr val="FF9900"/>
+                </a:solidFill>
+              </a:rPr>
+              <a:t>Choices, N. (2016) Alzheimer’s disease - symptoms. Available at: http://www.nhs.uk/Conditions/Alzheimers-disease/Pages/Symptoms.aspx (Accessed: 10 December 2016).</a:t>
+            </a:r>
+          </a:p>
+        </p:txBody>
+      </p:sp>
+      <p:pic>
+        <p:nvPicPr>
+          <p:cNvPr id="4" name="Picture 2" descr="https://www.everydayhero.co.uk/events/downloads/0000/2747/ARUK_campaign_logo_web.jpg"/>
+          <p:cNvPicPr>
+            <a:picLocks noChangeAspect="1" noChangeArrowheads="1"/>
+          </p:cNvPicPr>
+          <p:nvPr/>
+        </p:nvPicPr>
+        <p:blipFill>
+          <a:blip r:embed="rId3">
+            <a:extLst>
+              <a:ext uri="{28A0092B-C50C-407E-A947-70E740481C1C}">
+                <a14:useLocalDpi xmlns:a14="http://schemas.microsoft.com/office/drawing/2010/main" val="0"/>
+              </a:ext>
+            </a:extLst>
+          </a:blip>
+          <a:srcRect/>
+          <a:stretch>
+            <a:fillRect/>
+          </a:stretch>
+        </p:blipFill>
+        <p:spPr bwMode="auto">
+          <a:xfrm>
+            <a:off x="8942125" y="48247"/>
+            <a:ext cx="3203575" cy="1074116"/>
+          </a:xfrm>
+          <a:prstGeom prst="rect">
+            <a:avLst/>
+          </a:prstGeom>
+          <a:noFill/>
+          <a:extLst>
+            <a:ext uri="{909E8E84-426E-40DD-AFC4-6F175D3DCCD1}">
+              <a14:hiddenFill xmlns:a14="http://schemas.microsoft.com/office/drawing/2010/main">
+                <a:solidFill>
+                  <a:srgbClr val="FFFFFF"/>
+                </a:solidFill>
+              </a14:hiddenFill>
+            </a:ext>
+          </a:extLst>
+        </p:spPr>
+      </p:pic>
+    </p:spTree>
+    <p:extLst>
+      <p:ext uri="{BB962C8B-B14F-4D97-AF65-F5344CB8AC3E}">
+        <p14:creationId xmlns:p14="http://schemas.microsoft.com/office/powerpoint/2010/main" val="4011240471"/>
+      </p:ext>
+    </p:extLst>
+  </p:cSld>
+  <p:clrMapOvr>
+    <a:masterClrMapping/>
+  </p:clrMapOvr>
+</p:sld>
+</file>
+
+<file path=ppt/slides/slide11.xml><?xml version="1.0" encoding="utf-8"?>
+<p:sld xmlns:a="http://schemas.openxmlformats.org/drawingml/2006/main" xmlns:r="http://schemas.openxmlformats.org/officeDocument/2006/relationships" xmlns:p="http://schemas.openxmlformats.org/presentationml/2006/main">
+  <p:cSld>
+    <p:spTree>
+      <p:nvGrpSpPr>
+        <p:cNvPr id="1" name=""/>
+        <p:cNvGrpSpPr/>
+        <p:nvPr/>
+      </p:nvGrpSpPr>
+      <p:grpSpPr>
+        <a:xfrm>
+          <a:off x="0" y="0"/>
+          <a:ext cx="0" cy="0"/>
+          <a:chOff x="0" y="0"/>
+          <a:chExt cx="0" cy="0"/>
+        </a:xfrm>
+      </p:grpSpPr>
       <p:pic>
         <p:nvPicPr>
           <p:cNvPr id="1028" name="Picture 4" descr="http://i2.istockimg.com/file_thumbview_approve/66949071/5/stock-photo-66949071-orange-fruit-isolated-on-white.jpg"/>
@@ -4953,12 +5642,6 @@
             </a:pPr>
             <a:endParaRPr lang="en-GB" dirty="0"/>
           </a:p>
-          <a:p>
-            <a:pPr marL="0" indent="0">
-              <a:buNone/>
-            </a:pPr>
-            <a:endParaRPr lang="en-GB" dirty="0"/>
-          </a:p>
         </p:txBody>
       </p:sp>
       <p:pic>
@@ -5671,6 +6354,299 @@
           <a:chExt cx="0" cy="0"/>
         </a:xfrm>
       </p:grpSpPr>
+      <p:pic>
+        <p:nvPicPr>
+          <p:cNvPr id="9" name="Content Placeholder 8"/>
+          <p:cNvPicPr>
+            <a:picLocks noGrp="1" noChangeAspect="1"/>
+          </p:cNvPicPr>
+          <p:nvPr>
+            <p:ph idx="1"/>
+          </p:nvPr>
+        </p:nvPicPr>
+        <p:blipFill>
+          <a:blip r:embed="rId3">
+            <a:extLst>
+              <a:ext uri="{28A0092B-C50C-407E-A947-70E740481C1C}">
+                <a14:useLocalDpi xmlns:a14="http://schemas.microsoft.com/office/drawing/2010/main" val="0"/>
+              </a:ext>
+            </a:extLst>
+          </a:blip>
+          <a:stretch>
+            <a:fillRect/>
+          </a:stretch>
+        </p:blipFill>
+        <p:spPr>
+          <a:xfrm>
+            <a:off x="1057234" y="1075620"/>
+            <a:ext cx="4967206" cy="2792690"/>
+          </a:xfrm>
+        </p:spPr>
+      </p:pic>
+      <p:pic>
+        <p:nvPicPr>
+          <p:cNvPr id="10" name="Picture 9"/>
+          <p:cNvPicPr>
+            <a:picLocks noChangeAspect="1"/>
+          </p:cNvPicPr>
+          <p:nvPr/>
+        </p:nvPicPr>
+        <p:blipFill>
+          <a:blip r:embed="rId4">
+            <a:extLst>
+              <a:ext uri="{28A0092B-C50C-407E-A947-70E740481C1C}">
+                <a14:useLocalDpi xmlns:a14="http://schemas.microsoft.com/office/drawing/2010/main" val="0"/>
+              </a:ext>
+            </a:extLst>
+          </a:blip>
+          <a:stretch>
+            <a:fillRect/>
+          </a:stretch>
+        </p:blipFill>
+        <p:spPr>
+          <a:xfrm>
+            <a:off x="6265336" y="1075620"/>
+            <a:ext cx="4967205" cy="2792690"/>
+          </a:xfrm>
+          <a:prstGeom prst="rect">
+            <a:avLst/>
+          </a:prstGeom>
+        </p:spPr>
+      </p:pic>
+      <p:pic>
+        <p:nvPicPr>
+          <p:cNvPr id="11" name="Picture 10"/>
+          <p:cNvPicPr>
+            <a:picLocks noChangeAspect="1"/>
+          </p:cNvPicPr>
+          <p:nvPr/>
+        </p:nvPicPr>
+        <p:blipFill>
+          <a:blip r:embed="rId5">
+            <a:extLst>
+              <a:ext uri="{28A0092B-C50C-407E-A947-70E740481C1C}">
+                <a14:useLocalDpi xmlns:a14="http://schemas.microsoft.com/office/drawing/2010/main" val="0"/>
+              </a:ext>
+            </a:extLst>
+          </a:blip>
+          <a:stretch>
+            <a:fillRect/>
+          </a:stretch>
+        </p:blipFill>
+        <p:spPr>
+          <a:xfrm>
+            <a:off x="1057234" y="3953992"/>
+            <a:ext cx="4967206" cy="2792690"/>
+          </a:xfrm>
+          <a:prstGeom prst="rect">
+            <a:avLst/>
+          </a:prstGeom>
+        </p:spPr>
+      </p:pic>
+      <p:pic>
+        <p:nvPicPr>
+          <p:cNvPr id="16" name="Content Placeholder 9"/>
+          <p:cNvPicPr>
+            <a:picLocks noChangeAspect="1"/>
+          </p:cNvPicPr>
+          <p:nvPr/>
+        </p:nvPicPr>
+        <p:blipFill>
+          <a:blip r:embed="rId6">
+            <a:extLst>
+              <a:ext uri="{28A0092B-C50C-407E-A947-70E740481C1C}">
+                <a14:useLocalDpi xmlns:a14="http://schemas.microsoft.com/office/drawing/2010/main" val="0"/>
+              </a:ext>
+            </a:extLst>
+          </a:blip>
+          <a:stretch>
+            <a:fillRect/>
+          </a:stretch>
+        </p:blipFill>
+        <p:spPr>
+          <a:xfrm>
+            <a:off x="6265337" y="3953992"/>
+            <a:ext cx="4967205" cy="2792690"/>
+          </a:xfrm>
+          <a:prstGeom prst="rect">
+            <a:avLst/>
+          </a:prstGeom>
+        </p:spPr>
+      </p:pic>
+      <mc:AlternateContent xmlns:mc="http://schemas.openxmlformats.org/markup-compatibility/2006">
+        <mc:Choice xmlns:p14="http://schemas.microsoft.com/office/powerpoint/2010/main" Requires="p14">
+          <p:contentPart p14:bwMode="auto" r:id="rId7">
+            <p14:nvContentPartPr>
+              <p14:cNvPr id="21" name="Ink 20"/>
+              <p14:cNvContentPartPr/>
+              <p14:nvPr/>
+            </p14:nvContentPartPr>
+            <p14:xfrm>
+              <a:off x="6106565" y="2114948"/>
+              <a:ext cx="803109" cy="660137"/>
+            </p14:xfrm>
+          </p:contentPart>
+        </mc:Choice>
+        <mc:Fallback>
+          <p:pic>
+            <p:nvPicPr>
+              <p:cNvPr id="21" name="Ink 20"/>
+              <p:cNvPicPr/>
+              <p:nvPr/>
+            </p:nvPicPr>
+            <p:blipFill>
+              <a:blip r:embed="rId8"/>
+              <a:stretch>
+                <a:fillRect/>
+              </a:stretch>
+            </p:blipFill>
+            <p:spPr>
+              <a:xfrm>
+                <a:off x="6104765" y="2112788"/>
+                <a:ext cx="807069" cy="664456"/>
+              </a:xfrm>
+              <a:prstGeom prst="rect">
+                <a:avLst/>
+              </a:prstGeom>
+            </p:spPr>
+          </p:pic>
+        </mc:Fallback>
+      </mc:AlternateContent>
+      <mc:AlternateContent xmlns:mc="http://schemas.openxmlformats.org/markup-compatibility/2006">
+        <mc:Choice xmlns:p14="http://schemas.microsoft.com/office/powerpoint/2010/main" Requires="p14">
+          <p:contentPart p14:bwMode="auto" r:id="rId9">
+            <p14:nvContentPartPr>
+              <p14:cNvPr id="25" name="Ink 24"/>
+              <p14:cNvContentPartPr/>
+              <p14:nvPr/>
+            </p14:nvContentPartPr>
+            <p14:xfrm>
+              <a:off x="6138245" y="2496548"/>
+              <a:ext cx="206" cy="206"/>
+            </p14:xfrm>
+          </p:contentPart>
+        </mc:Choice>
+        <mc:Fallback>
+          <p:pic>
+            <p:nvPicPr>
+              <p:cNvPr id="25" name="Ink 24"/>
+              <p:cNvPicPr/>
+              <p:nvPr/>
+            </p:nvPicPr>
+            <p:blipFill>
+              <a:blip r:embed="rId10"/>
+              <a:stretch>
+                <a:fillRect/>
+              </a:stretch>
+            </p:blipFill>
+            <p:spPr>
+              <a:xfrm>
+                <a:off x="6137421" y="2495724"/>
+                <a:ext cx="1854" cy="1854"/>
+              </a:xfrm>
+              <a:prstGeom prst="rect">
+                <a:avLst/>
+              </a:prstGeom>
+            </p:spPr>
+          </p:pic>
+        </mc:Fallback>
+      </mc:AlternateContent>
+      <mc:AlternateContent xmlns:mc="http://schemas.openxmlformats.org/markup-compatibility/2006">
+        <mc:Choice xmlns:p14="http://schemas.microsoft.com/office/powerpoint/2010/main" Requires="p14">
+          <p:contentPart p14:bwMode="auto" r:id="rId11">
+            <p14:nvContentPartPr>
+              <p14:cNvPr id="28" name="Ink 27"/>
+              <p14:cNvContentPartPr/>
+              <p14:nvPr/>
+            </p14:nvContentPartPr>
+            <p14:xfrm>
+              <a:off x="6671045" y="620022"/>
+              <a:ext cx="16046" cy="8229"/>
+            </p14:xfrm>
+          </p:contentPart>
+        </mc:Choice>
+        <mc:Fallback>
+          <p:pic>
+            <p:nvPicPr>
+              <p:cNvPr id="28" name="Ink 27"/>
+              <p:cNvPicPr/>
+              <p:nvPr/>
+            </p:nvPicPr>
+            <p:blipFill>
+              <a:blip r:embed="rId12"/>
+              <a:stretch>
+                <a:fillRect/>
+              </a:stretch>
+            </p:blipFill>
+            <p:spPr>
+              <a:xfrm>
+                <a:off x="6669262" y="618233"/>
+                <a:ext cx="19255" cy="11449"/>
+              </a:xfrm>
+              <a:prstGeom prst="rect">
+                <a:avLst/>
+              </a:prstGeom>
+            </p:spPr>
+          </p:pic>
+        </mc:Fallback>
+      </mc:AlternateContent>
+      <p:sp>
+        <p:nvSpPr>
+          <p:cNvPr id="29" name="Title 1"/>
+          <p:cNvSpPr>
+            <a:spLocks noGrp="1"/>
+          </p:cNvSpPr>
+          <p:nvPr>
+            <p:ph type="title"/>
+          </p:nvPr>
+        </p:nvSpPr>
+        <p:spPr>
+          <a:xfrm>
+            <a:off x="983606" y="88803"/>
+            <a:ext cx="10245918" cy="1062437"/>
+          </a:xfrm>
+        </p:spPr>
+        <p:txBody>
+          <a:bodyPr/>
+          <a:lstStyle/>
+          <a:p>
+            <a:r>
+              <a:rPr lang="en-GB" b="1" dirty="0"/>
+              <a:t>Screenshots</a:t>
+            </a:r>
+          </a:p>
+        </p:txBody>
+      </p:sp>
+    </p:spTree>
+    <p:extLst>
+      <p:ext uri="{BB962C8B-B14F-4D97-AF65-F5344CB8AC3E}">
+        <p14:creationId xmlns:p14="http://schemas.microsoft.com/office/powerpoint/2010/main" val="533862436"/>
+      </p:ext>
+    </p:extLst>
+  </p:cSld>
+  <p:clrMapOvr>
+    <a:masterClrMapping/>
+  </p:clrMapOvr>
+</p:sld>
+</file>
+
+<file path=ppt/slides/slide9.xml><?xml version="1.0" encoding="utf-8"?>
+<p:sld xmlns:a="http://schemas.openxmlformats.org/drawingml/2006/main" xmlns:r="http://schemas.openxmlformats.org/officeDocument/2006/relationships" xmlns:p="http://schemas.openxmlformats.org/presentationml/2006/main">
+  <p:cSld>
+    <p:spTree>
+      <p:nvGrpSpPr>
+        <p:cNvPr id="1" name=""/>
+        <p:cNvGrpSpPr/>
+        <p:nvPr/>
+      </p:nvGrpSpPr>
+      <p:grpSpPr>
+        <a:xfrm>
+          <a:off x="0" y="0"/>
+          <a:ext cx="0" cy="0"/>
+          <a:chOff x="0" y="0"/>
+          <a:chExt cx="0" cy="0"/>
+        </a:xfrm>
+      </p:grpSpPr>
       <p:sp>
         <p:nvSpPr>
           <p:cNvPr id="2" name="Title 1"/>
@@ -5807,353 +6783,6 @@
     <p:extLst>
       <p:ext uri="{BB962C8B-B14F-4D97-AF65-F5344CB8AC3E}">
         <p14:creationId xmlns:p14="http://schemas.microsoft.com/office/powerpoint/2010/main" val="1846106008"/>
-      </p:ext>
-    </p:extLst>
-  </p:cSld>
-  <p:clrMapOvr>
-    <a:masterClrMapping/>
-  </p:clrMapOvr>
-</p:sld>
-</file>
-
-<file path=ppt/slides/slide9.xml><?xml version="1.0" encoding="utf-8"?>
-<p:sld xmlns:a="http://schemas.openxmlformats.org/drawingml/2006/main" xmlns:r="http://schemas.openxmlformats.org/officeDocument/2006/relationships" xmlns:p="http://schemas.openxmlformats.org/presentationml/2006/main">
-  <p:cSld>
-    <p:spTree>
-      <p:nvGrpSpPr>
-        <p:cNvPr id="1" name=""/>
-        <p:cNvGrpSpPr/>
-        <p:nvPr/>
-      </p:nvGrpSpPr>
-      <p:grpSpPr>
-        <a:xfrm>
-          <a:off x="0" y="0"/>
-          <a:ext cx="0" cy="0"/>
-          <a:chOff x="0" y="0"/>
-          <a:chExt cx="0" cy="0"/>
-        </a:xfrm>
-      </p:grpSpPr>
-      <p:sp>
-        <p:nvSpPr>
-          <p:cNvPr id="2" name="Title 1"/>
-          <p:cNvSpPr>
-            <a:spLocks noGrp="1"/>
-          </p:cNvSpPr>
-          <p:nvPr>
-            <p:ph type="title"/>
-          </p:nvPr>
-        </p:nvSpPr>
-        <p:spPr/>
-        <p:txBody>
-          <a:bodyPr>
-            <a:normAutofit/>
-          </a:bodyPr>
-          <a:lstStyle/>
-          <a:p>
-            <a:r>
-              <a:rPr lang="en-GB" sz="4800" b="1" dirty="0"/>
-              <a:t>References:</a:t>
-            </a:r>
-          </a:p>
-        </p:txBody>
-      </p:sp>
-      <p:sp>
-        <p:nvSpPr>
-          <p:cNvPr id="3" name="Content Placeholder 2"/>
-          <p:cNvSpPr>
-            <a:spLocks noGrp="1"/>
-          </p:cNvSpPr>
-          <p:nvPr>
-            <p:ph idx="1"/>
-          </p:nvPr>
-        </p:nvSpPr>
-        <p:spPr>
-          <a:xfrm>
-            <a:off x="465221" y="1825625"/>
-            <a:ext cx="10888579" cy="4351338"/>
-          </a:xfrm>
-        </p:spPr>
-        <p:txBody>
-          <a:bodyPr>
-            <a:normAutofit lnSpcReduction="10000"/>
-          </a:bodyPr>
-          <a:lstStyle/>
-          <a:p>
-            <a:pPr lvl="1">
-              <a:buFont typeface="+mj-lt"/>
-              <a:buAutoNum type="arabicPeriod"/>
-            </a:pPr>
-            <a:r>
-              <a:rPr lang="en-GB" sz="1200" dirty="0"/>
-              <a:t>“What is the most common form of dementia?”</a:t>
-            </a:r>
-            <a:br>
-              <a:rPr lang="en-GB" sz="1200" dirty="0"/>
-            </a:br>
-            <a:r>
-              <a:rPr lang="en-GB" sz="1200" i="1" dirty="0">
-                <a:solidFill>
-                  <a:srgbClr val="FF9900"/>
-                </a:solidFill>
-              </a:rPr>
-              <a:t>Judd, N. and Society, A. (2007) What is Alzheimer’s disease? - Alzheimer’s society. Available at: https://www.alzheimers.org.uk/site/scripts/documents_info.php?documentID=100 (Accessed: 10 December 2016).</a:t>
-            </a:r>
-          </a:p>
-          <a:p>
-            <a:pPr lvl="1">
-              <a:buFont typeface="+mj-lt"/>
-              <a:buAutoNum type="arabicPeriod"/>
-            </a:pPr>
-            <a:r>
-              <a:rPr lang="en-GB" sz="1200" dirty="0"/>
-              <a:t>“Who has a higher risk of developing Alzheimer’s disease?”</a:t>
-            </a:r>
-            <a:br>
-              <a:rPr lang="en-GB" sz="1200" dirty="0"/>
-            </a:br>
-            <a:r>
-              <a:rPr lang="en-GB" sz="1200" i="1" dirty="0">
-                <a:solidFill>
-                  <a:srgbClr val="FF9900"/>
-                </a:solidFill>
-              </a:rPr>
-              <a:t>Sauer, A. (2015) Why is Alzheimer’s more likely in women? Available at: http://www.alzheimers.net/8-12-15-why-is-alzheimers-more-likely-in-women/ (Accessed: 10 December 2016).</a:t>
-            </a:r>
-          </a:p>
-          <a:p>
-            <a:pPr lvl="1">
-              <a:buFont typeface="+mj-lt"/>
-              <a:buAutoNum type="arabicPeriod"/>
-            </a:pPr>
-            <a:r>
-              <a:rPr lang="en-GB" sz="1200" dirty="0"/>
-              <a:t>“What are the two proteins responsible for dementia?”</a:t>
-            </a:r>
-            <a:br>
-              <a:rPr lang="en-GB" sz="1200" dirty="0"/>
-            </a:br>
-            <a:r>
-              <a:rPr lang="en-GB" sz="1200" i="1" dirty="0">
-                <a:solidFill>
-                  <a:srgbClr val="FF9900"/>
-                </a:solidFill>
-              </a:rPr>
-              <a:t>Bloom, G.S. (2014) ‘Amyloid-</a:t>
-            </a:r>
-            <a:r>
-              <a:rPr lang="el-GR" sz="1200" i="1" dirty="0">
-                <a:solidFill>
-                  <a:srgbClr val="FF9900"/>
-                </a:solidFill>
-              </a:rPr>
-              <a:t>β </a:t>
-            </a:r>
-            <a:r>
-              <a:rPr lang="en-GB" sz="1200" i="1" dirty="0">
-                <a:solidFill>
-                  <a:srgbClr val="FF9900"/>
-                </a:solidFill>
-              </a:rPr>
-              <a:t>and Tau’, JAMA Neurology, 71(4), p. 505. </a:t>
-            </a:r>
-            <a:r>
-              <a:rPr lang="en-GB" sz="1200" i="1" dirty="0" err="1">
-                <a:solidFill>
-                  <a:srgbClr val="FF9900"/>
-                </a:solidFill>
-              </a:rPr>
-              <a:t>doi</a:t>
-            </a:r>
-            <a:r>
-              <a:rPr lang="en-GB" sz="1200" i="1" dirty="0">
-                <a:solidFill>
-                  <a:srgbClr val="FF9900"/>
-                </a:solidFill>
-              </a:rPr>
-              <a:t>: 10.1001/jamaneurol.2013.5847.</a:t>
-            </a:r>
-          </a:p>
-          <a:p>
-            <a:pPr lvl="1">
-              <a:buFont typeface="+mj-lt"/>
-              <a:buAutoNum type="arabicPeriod"/>
-            </a:pPr>
-            <a:r>
-              <a:rPr lang="en-GB" sz="1200" dirty="0"/>
-              <a:t>“Is there a cure for Alzheimer’s disease?”</a:t>
-            </a:r>
-            <a:br>
-              <a:rPr lang="en-GB" sz="1200" dirty="0"/>
-            </a:br>
-            <a:r>
-              <a:rPr lang="en-GB" sz="1200" i="1" dirty="0">
-                <a:solidFill>
-                  <a:srgbClr val="FF9900"/>
-                </a:solidFill>
-              </a:rPr>
-              <a:t>Association®, A. (2016) Latest treatment options. Available at: http://www.alz.org/alzheimers_disease_treatments.asp (Accessed: 10 December 2016).</a:t>
-            </a:r>
-          </a:p>
-          <a:p>
-            <a:pPr lvl="1">
-              <a:buFont typeface="+mj-lt"/>
-              <a:buAutoNum type="arabicPeriod"/>
-            </a:pPr>
-            <a:r>
-              <a:rPr lang="en-GB" sz="1200" dirty="0"/>
-              <a:t>“How much does dementia effect the global economy?”</a:t>
-            </a:r>
-            <a:br>
-              <a:rPr lang="en-GB" sz="1200" i="1" dirty="0"/>
-            </a:br>
-            <a:r>
-              <a:rPr lang="en-GB" sz="1200" dirty="0">
-                <a:solidFill>
-                  <a:srgbClr val="FF9900"/>
-                </a:solidFill>
-              </a:rPr>
-              <a:t>10 things you need to know about the impact of dementia on people, carers and the economy | Alzheimer’s research UK (2017) Available at: http://www.alzheimersresearchuk.org/about-dementia/facts-stats/10-things-you-need-to-know-about-the-impact-of-dementia/ (Accessed: 10 December 2016).</a:t>
-            </a:r>
-          </a:p>
-          <a:p>
-            <a:pPr lvl="1">
-              <a:buFont typeface="+mj-lt"/>
-              <a:buAutoNum type="arabicPeriod"/>
-            </a:pPr>
-            <a:r>
-              <a:rPr lang="en-GB" sz="1200" dirty="0"/>
-              <a:t>“Is Alzheimer’s disease fatal?”</a:t>
-            </a:r>
-            <a:br>
-              <a:rPr lang="en-GB" sz="1200" dirty="0"/>
-            </a:br>
-            <a:r>
-              <a:rPr lang="en-GB" sz="1200" i="1" dirty="0">
-                <a:solidFill>
-                  <a:srgbClr val="FF9900"/>
-                </a:solidFill>
-              </a:rPr>
-              <a:t>Association®, A. (2016) Memory loss myths &amp; facts. Available at: http://www.alz.org/alzheimers_disease_myths_about_alzheimers.asp (Accessed: 10 December 2016).</a:t>
-            </a:r>
-          </a:p>
-          <a:p>
-            <a:pPr lvl="1">
-              <a:buFont typeface="+mj-lt"/>
-              <a:buAutoNum type="arabicPeriod"/>
-            </a:pPr>
-            <a:r>
-              <a:rPr lang="en-GB" sz="1200" dirty="0"/>
-              <a:t>Does Alzheimer's only effect people over 65? </a:t>
-            </a:r>
-            <a:br>
-              <a:rPr lang="en-GB" sz="1200" dirty="0"/>
-            </a:br>
-            <a:r>
-              <a:rPr lang="en-GB" sz="1200" i="1" dirty="0">
-                <a:solidFill>
-                  <a:srgbClr val="FF9900"/>
-                </a:solidFill>
-              </a:rPr>
-              <a:t>Association®, A. (2016) Memory loss myths &amp; facts. Available at: http://www.alz.org/alzheimers_disease_myths_about_alzheimers.asp (Accessed: 10 December 2016).</a:t>
-            </a:r>
-          </a:p>
-          <a:p>
-            <a:pPr lvl="1">
-              <a:buFont typeface="+mj-lt"/>
-              <a:buAutoNum type="arabicPeriod"/>
-            </a:pPr>
-            <a:r>
-              <a:rPr lang="en-GB" sz="1200" dirty="0"/>
-              <a:t>“Alzheimer’s and </a:t>
-            </a:r>
-            <a:r>
-              <a:rPr lang="en-GB" sz="1200" dirty="0" err="1"/>
-              <a:t>Dimentia</a:t>
-            </a:r>
-            <a:r>
-              <a:rPr lang="en-GB" sz="1200" dirty="0"/>
-              <a:t> are the leading causes of death in the UK?”</a:t>
-            </a:r>
-            <a:br>
-              <a:rPr lang="en-GB" sz="1200" dirty="0"/>
-            </a:br>
-            <a:r>
-              <a:rPr lang="en-GB" sz="1200" i="1" dirty="0">
-                <a:solidFill>
-                  <a:srgbClr val="FF9900"/>
-                </a:solidFill>
-              </a:rPr>
-              <a:t>Siddique, H. (2016) Dementia and Alzheimer’s leading cause of death in England and wales. Available at: https://www.theguardian.com/society/2016/nov/14/dementia-and-alzheimers-leading-cause-of-death-england-and-wales (Accessed: 10 December 2016).</a:t>
-            </a:r>
-          </a:p>
-          <a:p>
-            <a:pPr lvl="1">
-              <a:buFont typeface="+mj-lt"/>
-              <a:buAutoNum type="arabicPeriod"/>
-            </a:pPr>
-            <a:r>
-              <a:rPr lang="en-GB" sz="1200" dirty="0"/>
-              <a:t>“Are the most prominent symptoms of Alzheimer's disease include memory loss, gradual loss of speech, and/or difficulties with any physical movements?”</a:t>
-            </a:r>
-            <a:br>
-              <a:rPr lang="en-GB" sz="1200" dirty="0"/>
-            </a:br>
-            <a:r>
-              <a:rPr lang="en-GB" sz="1200" i="1" dirty="0">
-                <a:solidFill>
-                  <a:srgbClr val="FF9900"/>
-                </a:solidFill>
-              </a:rPr>
-              <a:t>Choices, N. (2016) Alzheimer’s disease - symptoms. Available at: http://www.nhs.uk/Conditions/Alzheimers-disease/Pages/Symptoms.aspx (Accessed: 10 December 2016).</a:t>
-            </a:r>
-          </a:p>
-        </p:txBody>
-      </p:sp>
-      <p:pic>
-        <p:nvPicPr>
-          <p:cNvPr id="4" name="Picture 2" descr="https://www.everydayhero.co.uk/events/downloads/0000/2747/ARUK_campaign_logo_web.jpg"/>
-          <p:cNvPicPr>
-            <a:picLocks noChangeAspect="1" noChangeArrowheads="1"/>
-          </p:cNvPicPr>
-          <p:nvPr/>
-        </p:nvPicPr>
-        <p:blipFill>
-          <a:blip r:embed="rId3">
-            <a:extLst>
-              <a:ext uri="{28A0092B-C50C-407E-A947-70E740481C1C}">
-                <a14:useLocalDpi xmlns:a14="http://schemas.microsoft.com/office/drawing/2010/main" val="0"/>
-              </a:ext>
-            </a:extLst>
-          </a:blip>
-          <a:srcRect/>
-          <a:stretch>
-            <a:fillRect/>
-          </a:stretch>
-        </p:blipFill>
-        <p:spPr bwMode="auto">
-          <a:xfrm>
-            <a:off x="8942125" y="48247"/>
-            <a:ext cx="3203575" cy="1074116"/>
-          </a:xfrm>
-          <a:prstGeom prst="rect">
-            <a:avLst/>
-          </a:prstGeom>
-          <a:noFill/>
-          <a:extLst>
-            <a:ext uri="{909E8E84-426E-40DD-AFC4-6F175D3DCCD1}">
-              <a14:hiddenFill xmlns:a14="http://schemas.microsoft.com/office/drawing/2010/main">
-                <a:solidFill>
-                  <a:srgbClr val="FFFFFF"/>
-                </a:solidFill>
-              </a14:hiddenFill>
-            </a:ext>
-          </a:extLst>
-        </p:spPr>
-      </p:pic>
-    </p:spTree>
-    <p:extLst>
-      <p:ext uri="{BB962C8B-B14F-4D97-AF65-F5344CB8AC3E}">
-        <p14:creationId xmlns:p14="http://schemas.microsoft.com/office/powerpoint/2010/main" val="4011240471"/>
       </p:ext>
     </p:extLst>
   </p:cSld>

</xml_diff>